<commit_message>
Powerpoint update, will finish the rest later tonight
</commit_message>
<xml_diff>
--- a/SexDimDPro.pptx
+++ b/SexDimDPro.pptx
@@ -3537,42 +3537,86 @@
               <a:buNone/>
             </a:pPr>
             <a:r>
+              <a:rPr i="1"/>
+              <a:t>Drosophila prolongata</a:t>
+            </a:r>
+            <a:r>
               <a:rPr/>
-              <a:t>Data Analysis</a:t>
-            </a:r>
-          </a:p>
-        </p:txBody>
-      </p:sp>
-      <p:pic>
-        <p:nvPicPr>
-          <p:cNvPr descr="SexDimDPro_files/figure-pptx/pressure-1.png" id="0" name="Picture 1"/>
-          <p:cNvPicPr>
-            <a:picLocks noGrp="1" noChangeAspect="1"/>
-          </p:cNvPicPr>
-          <p:nvPr/>
-        </p:nvPicPr>
-        <p:blipFill>
-          <a:blip r:embed="rId2"/>
-          <a:stretch>
-            <a:fillRect/>
-          </a:stretch>
-        </p:blipFill>
-        <p:spPr bwMode="auto">
-          <a:xfrm>
-            <a:off x="2451100" y="1193800"/>
-            <a:ext cx="4241800" cy="3390900"/>
-          </a:xfrm>
-          <a:prstGeom prst="rect">
-            <a:avLst/>
-          </a:prstGeom>
-          <a:noFill/>
-          <a:ln w="9525">
-            <a:noFill/>
-            <a:headEnd/>
-            <a:tailEnd/>
-          </a:ln>
-        </p:spPr>
-      </p:pic>
+              <a:t> Observations</a:t>
+            </a:r>
+          </a:p>
+        </p:txBody>
+      </p:sp>
+      <p:sp>
+        <p:nvSpPr>
+          <p:cNvPr id="3" name="Content Placeholder 2"/>
+          <p:cNvSpPr>
+            <a:spLocks noGrp="1"/>
+          </p:cNvSpPr>
+          <p:nvPr>
+            <p:ph idx="1"/>
+          </p:nvPr>
+        </p:nvSpPr>
+        <p:spPr/>
+        <p:txBody>
+          <a:bodyPr/>
+          <a:lstStyle/>
+          <a:p>
+            <a:pPr lvl="0"/>
+            <a:r>
+              <a:rPr i="1"/>
+              <a:t>D. prolongata</a:t>
+            </a:r>
+            <a:r>
+              <a:rPr/>
+              <a:t> has strong sexual dimorphism in tibia and tarsus size</a:t>
+            </a:r>
+          </a:p>
+          <a:p>
+            <a:pPr lvl="1"/>
+            <a:r>
+              <a:rPr/>
+              <a:t>despite this, they are only moderately condition dependent</a:t>
+            </a:r>
+          </a:p>
+          <a:p>
+            <a:pPr lvl="1"/>
+            <a:r>
+              <a:rPr/>
+              <a:t>all other species in the experiment exhibited moderate dimorphism and condition dependence</a:t>
+            </a:r>
+          </a:p>
+          <a:p>
+            <a:pPr lvl="0"/>
+            <a:r>
+              <a:rPr/>
+              <a:t>This leads us to a couple new hypotheses to investigate about </a:t>
+            </a:r>
+            <a:r>
+              <a:rPr i="1"/>
+              <a:t>D. prolongata</a:t>
+            </a:r>
+          </a:p>
+          <a:p>
+            <a:pPr lvl="1" indent="-342900" marL="685800">
+              <a:buAutoNum type="arabicPeriod"/>
+            </a:pPr>
+            <a:r>
+              <a:rPr/>
+              <a:t>Starvation during larval development will decrease sexual dimorphism in forelegs</a:t>
+            </a:r>
+          </a:p>
+          <a:p>
+            <a:pPr lvl="1" indent="-342900" marL="685800">
+              <a:buAutoNum type="arabicPeriod"/>
+            </a:pPr>
+            <a:r>
+              <a:rPr/>
+              <a:t>More sexually dimorphic traits (forelegs) will exhibit more condition dependence than less dimorphic traits (wings)</a:t>
+            </a:r>
+          </a:p>
+        </p:txBody>
+      </p:sp>
     </p:spTree>
   </p:cSld>
 </p:sld>

</xml_diff>

<commit_message>
edits - new presentation
</commit_message>
<xml_diff>
--- a/SexDimDPro.pptx
+++ b/SexDimDPro.pptx
@@ -13,6 +13,7 @@
     <p:sldId id="261" r:id="rId7"/>
     <p:sldId id="262" r:id="rId8"/>
     <p:sldId id="263" r:id="rId9"/>
+    <p:sldId id="264" r:id="rId10"/>
   </p:sldIdLst>
   <p:sldSz cx="9144000" cy="5143500" type="screen16x9"/>
   <p:notesSz cx="6858000" cy="9144000"/>
@@ -4404,6 +4405,58 @@
 </file>
 
 <file path=ppt/slides/slide8.xml><?xml version="1.0" encoding="utf-8"?>
+<p:sld xmlns:a="http://schemas.openxmlformats.org/drawingml/2006/main" xmlns:r="http://schemas.openxmlformats.org/officeDocument/2006/relationships" xmlns:p="http://schemas.openxmlformats.org/presentationml/2006/main">
+  <p:cSld>
+    <p:spTree>
+      <p:nvGrpSpPr>
+        <p:cNvPr id="1" name=""/>
+        <p:cNvGrpSpPr/>
+        <p:nvPr/>
+      </p:nvGrpSpPr>
+      <p:grpSpPr>
+        <a:xfrm>
+          <a:off x="0" y="0"/>
+          <a:ext cx="0" cy="0"/>
+          <a:chOff x="0" y="0"/>
+          <a:chExt cx="0" cy="0"/>
+        </a:xfrm>
+      </p:grpSpPr>
+      <p:pic>
+        <p:nvPicPr>
+          <p:cNvPr descr="SexDimDPro_files/figure-pptx/correlation-1.png" id="0" name="Picture 1"/>
+          <p:cNvPicPr>
+            <a:picLocks noGrp="1" noChangeAspect="1"/>
+          </p:cNvPicPr>
+          <p:nvPr/>
+        </p:nvPicPr>
+        <p:blipFill>
+          <a:blip r:embed="rId2"/>
+          <a:stretch>
+            <a:fillRect/>
+          </a:stretch>
+        </p:blipFill>
+        <p:spPr bwMode="auto">
+          <a:xfrm>
+            <a:off x="2451100" y="1193800"/>
+            <a:ext cx="4241800" cy="3390900"/>
+          </a:xfrm>
+          <a:prstGeom prst="rect">
+            <a:avLst/>
+          </a:prstGeom>
+          <a:noFill/>
+          <a:ln w="9525">
+            <a:noFill/>
+            <a:headEnd/>
+            <a:tailEnd/>
+          </a:ln>
+        </p:spPr>
+      </p:pic>
+    </p:spTree>
+  </p:cSld>
+</p:sld>
+</file>
+
+<file path=ppt/slides/slide9.xml><?xml version="1.0" encoding="utf-8"?>
 <p:sld xmlns:a="http://schemas.openxmlformats.org/drawingml/2006/main" xmlns:r="http://schemas.openxmlformats.org/officeDocument/2006/relationships" xmlns:p="http://schemas.openxmlformats.org/presentationml/2006/main">
   <p:cSld>
     <p:spTree>

</xml_diff>

<commit_message>
Fixing version differences with github
</commit_message>
<xml_diff>
--- a/SexDimDPro.pptx
+++ b/SexDimDPro.pptx
@@ -3731,7 +3731,7 @@
             <a:pPr lvl="1"/>
             <a:r>
               <a:rPr/>
-              <a:t>will allow us to investigate size without the influence of shape</a:t>
+              <a:t>allows us to investigate size without the influence of shape</a:t>
             </a:r>
           </a:p>
           <a:p>
@@ -3746,6 +3746,20 @@
             <a:r>
               <a:rPr/>
               <a:t>allows us to investigate proportional size differences instead of absolute</a:t>
+            </a:r>
+          </a:p>
+          <a:p>
+            <a:pPr lvl="0"/>
+            <a:r>
+              <a:rPr/>
+              <a:t>Multivariate Analysis</a:t>
+            </a:r>
+          </a:p>
+          <a:p>
+            <a:pPr lvl="1"/>
+            <a:r>
+              <a:rPr/>
+              <a:t>allows us to investigate each trait’s relationship to the others with respect to size data</a:t>
             </a:r>
           </a:p>
         </p:txBody>

</xml_diff>